<commit_message>
ripulitura del repository e creazione presentazione e documentazione del progetto
</commit_message>
<xml_diff>
--- a/documentation/presentazione_progetto_ICON.pptx
+++ b/documentation/presentazione_progetto_ICON.pptx
@@ -9030,13 +9030,13 @@
   <p:clrMapOvr>
     <a:masterClrMapping/>
   </p:clrMapOvr>
-  <mc:AlternateContent xmlns:mc="http://schemas.openxmlformats.org/markup-compatibility/2006">
-    <mc:Choice xmlns:p14="http://schemas.microsoft.com/office/powerpoint/2010/main" Requires="p14">
+  <mc:AlternateContent xmlns:mc="http://schemas.openxmlformats.org/markup-compatibility/2006" xmlns:p14="http://schemas.microsoft.com/office/powerpoint/2010/main">
+    <mc:Choice Requires="p14">
       <p:transition spd="slow">
         <p14:flash/>
       </p:transition>
     </mc:Choice>
-    <mc:Fallback>
+    <mc:Fallback xmlns="">
       <p:transition spd="slow">
         <p:fade/>
       </p:transition>
@@ -9444,6 +9444,48 @@
           </a:p>
         </p:txBody>
       </p:sp>
+      <p:sp>
+        <p:nvSpPr>
+          <p:cNvPr id="4" name="TextBox 3">
+            <a:extLst>
+              <a:ext uri="{FF2B5EF4-FFF2-40B4-BE49-F238E27FC236}">
+                <a16:creationId xmlns:a16="http://schemas.microsoft.com/office/drawing/2014/main" id="{791839A5-06F2-3B4A-AC06-FDCA56899F5D}"/>
+              </a:ext>
+            </a:extLst>
+          </p:cNvPr>
+          <p:cNvSpPr txBox="1"/>
+          <p:nvPr/>
+        </p:nvSpPr>
+        <p:spPr>
+          <a:xfrm>
+            <a:off x="8304245" y="4665306"/>
+            <a:ext cx="3350732" cy="954107"/>
+          </a:xfrm>
+          <a:prstGeom prst="rect">
+            <a:avLst/>
+          </a:prstGeom>
+          <a:noFill/>
+        </p:spPr>
+        <p:txBody>
+          <a:bodyPr wrap="square" rtlCol="0">
+            <a:spAutoFit/>
+          </a:bodyPr>
+          <a:lstStyle/>
+          <a:p>
+            <a:pPr algn="just"/>
+            <a:r>
+              <a:rPr lang="it-IT" sz="1400" dirty="0">
+                <a:solidFill>
+                  <a:srgbClr val="D3AB03"/>
+                </a:solidFill>
+                <a:latin typeface="Cascadia Code" panose="020B0609020000020004" pitchFamily="49" charset="0"/>
+                <a:cs typeface="Cascadia Code" panose="020B0609020000020004" pitchFamily="49" charset="0"/>
+              </a:rPr>
+              <a:t>Il RUS lavora andando a rimuovere casualmente esempi appartenenti alla classe maggioritaria.</a:t>
+            </a:r>
+          </a:p>
+        </p:txBody>
+      </p:sp>
     </p:spTree>
     <p:extLst>
       <p:ext uri="{BB962C8B-B14F-4D97-AF65-F5344CB8AC3E}">
@@ -9454,13 +9496,13 @@
   <p:clrMapOvr>
     <a:masterClrMapping/>
   </p:clrMapOvr>
-  <mc:AlternateContent xmlns:mc="http://schemas.openxmlformats.org/markup-compatibility/2006">
-    <mc:Choice xmlns:p15="http://schemas.microsoft.com/office/powerpoint/2012/main" Requires="p15">
+  <mc:AlternateContent xmlns:mc="http://schemas.openxmlformats.org/markup-compatibility/2006" xmlns:p15="http://schemas.microsoft.com/office/powerpoint/2012/main">
+    <mc:Choice Requires="p15">
       <p:transition xmlns:p14="http://schemas.microsoft.com/office/powerpoint/2010/main" spd="slow" p14:dur="2000">
         <p15:prstTrans prst="fallOver"/>
       </p:transition>
     </mc:Choice>
-    <mc:Fallback>
+    <mc:Fallback xmlns="">
       <p:transition spd="slow">
         <p:fade/>
       </p:transition>
@@ -9934,7 +9976,7 @@
                 <a:latin typeface="Cascadia Code" panose="020B0609020000020004" pitchFamily="49" charset="0"/>
                 <a:cs typeface="Cascadia Code" panose="020B0609020000020004" pitchFamily="49" charset="0"/>
               </a:rPr>
-              <a:t>Durante l’addestramento e dai grafici ci evince come il gaussian naive bayes abbia avuto meno difficolta di apprendimento rispetto alla regressione logistica. </a:t>
+              <a:t>Durante l’addestramento e dai grafici si evince come il gaussian naive bayes abbia avuto meno difficolta di apprendimento rispetto alla regressione logistica. </a:t>
             </a:r>
           </a:p>
         </p:txBody>
@@ -9949,13 +9991,13 @@
   <p:clrMapOvr>
     <a:masterClrMapping/>
   </p:clrMapOvr>
-  <mc:AlternateContent xmlns:mc="http://schemas.openxmlformats.org/markup-compatibility/2006">
-    <mc:Choice xmlns:p14="http://schemas.microsoft.com/office/powerpoint/2010/main" Requires="p14">
+  <mc:AlternateContent xmlns:mc="http://schemas.openxmlformats.org/markup-compatibility/2006" xmlns:p14="http://schemas.microsoft.com/office/powerpoint/2010/main">
+    <mc:Choice Requires="p14">
       <p:transition spd="slow" p14:dur="2500">
         <p:checker/>
       </p:transition>
     </mc:Choice>
-    <mc:Fallback>
+    <mc:Fallback xmlns="">
       <p:transition spd="slow">
         <p:checker/>
       </p:transition>
@@ -10405,13 +10447,13 @@
   <p:clrMapOvr>
     <a:masterClrMapping/>
   </p:clrMapOvr>
-  <mc:AlternateContent xmlns:mc="http://schemas.openxmlformats.org/markup-compatibility/2006">
-    <mc:Choice xmlns:p14="http://schemas.microsoft.com/office/powerpoint/2010/main" Requires="p14">
+  <mc:AlternateContent xmlns:mc="http://schemas.openxmlformats.org/markup-compatibility/2006" xmlns:p14="http://schemas.microsoft.com/office/powerpoint/2010/main">
+    <mc:Choice Requires="p14">
       <p:transition spd="slow" p14:dur="2500">
         <p:checker/>
       </p:transition>
     </mc:Choice>
-    <mc:Fallback>
+    <mc:Fallback xmlns="">
       <p:transition spd="slow">
         <p:checker/>
       </p:transition>
@@ -10816,8 +10858,8 @@
         </p:nvSpPr>
         <p:spPr>
           <a:xfrm>
-            <a:off x="6518282" y="1837414"/>
-            <a:ext cx="5359393" cy="584775"/>
+            <a:off x="6456254" y="1950069"/>
+            <a:ext cx="5570806" cy="584775"/>
           </a:xfrm>
           <a:prstGeom prst="rect">
             <a:avLst/>
@@ -10835,7 +10877,7 @@
                 <a:latin typeface="Cascadia Code" panose="020B0609020000020004" pitchFamily="49" charset="0"/>
                 <a:cs typeface="Cascadia Code" panose="020B0609020000020004" pitchFamily="49" charset="0"/>
               </a:rPr>
-              <a:t>I modelli a confronto regressione logistica e gaussian naive bayes</a:t>
+              <a:t>I modelli a confronto: regressione logistica e gaussian naive bayes</a:t>
             </a:r>
           </a:p>
         </p:txBody>
@@ -10877,7 +10919,7 @@
                 <a:latin typeface="Cascadia Code" panose="020B0609020000020004" pitchFamily="49" charset="0"/>
                 <a:cs typeface="Cascadia Code" panose="020B0609020000020004" pitchFamily="49" charset="0"/>
               </a:rPr>
-              <a:t>Questa tecnica va a generare degli esempi sintetici. Questa è la principale differenza tra under sampling e over sampling mentre il primo perde informazione rimuovendo esempi l’altro introduce informazione poco valida con esempi fittizi.</a:t>
+              <a:t>Questa tecnica va a generare degli esempi sintetici. Questa è la principale differenza tra under sampling e over sampling mentre il primo perde informazione rimuovendo esempi, l’altro introduce informazione poco valida con esempi fittizi.</a:t>
             </a:r>
           </a:p>
         </p:txBody>
@@ -10892,13 +10934,13 @@
   <p:clrMapOvr>
     <a:masterClrMapping/>
   </p:clrMapOvr>
-  <mc:AlternateContent xmlns:mc="http://schemas.openxmlformats.org/markup-compatibility/2006">
-    <mc:Choice xmlns:p15="http://schemas.microsoft.com/office/powerpoint/2012/main" Requires="p15">
+  <mc:AlternateContent xmlns:mc="http://schemas.openxmlformats.org/markup-compatibility/2006" xmlns:p15="http://schemas.microsoft.com/office/powerpoint/2012/main">
+    <mc:Choice Requires="p15">
       <p:transition xmlns:p14="http://schemas.microsoft.com/office/powerpoint/2010/main" spd="slow" p14:dur="2000">
         <p15:prstTrans prst="fallOver"/>
       </p:transition>
     </mc:Choice>
-    <mc:Fallback>
+    <mc:Fallback xmlns="">
       <p:transition spd="slow">
         <p:fade/>
       </p:transition>
@@ -11372,7 +11414,7 @@
                 <a:latin typeface="Cascadia Code" panose="020B0609020000020004" pitchFamily="49" charset="0"/>
                 <a:cs typeface="Cascadia Code" panose="020B0609020000020004" pitchFamily="49" charset="0"/>
               </a:rPr>
-              <a:t>Dai grafici del recall durante il processo di apprendimento si nota come nel tempo dopo aver osservati un buon numero di esempi le percentuali tendano a stabilizzarsi.</a:t>
+              <a:t>Dai grafici del recall durante il processo di apprendimento si nota come nel tempo dopo aver osservato un buon numero di esempi le percentuali tendano a stabilizzarsi.</a:t>
             </a:r>
           </a:p>
         </p:txBody>
@@ -11387,13 +11429,13 @@
   <p:clrMapOvr>
     <a:masterClrMapping/>
   </p:clrMapOvr>
-  <mc:AlternateContent xmlns:mc="http://schemas.openxmlformats.org/markup-compatibility/2006">
-    <mc:Choice xmlns:p14="http://schemas.microsoft.com/office/powerpoint/2010/main" Requires="p14">
+  <mc:AlternateContent xmlns:mc="http://schemas.openxmlformats.org/markup-compatibility/2006" xmlns:p14="http://schemas.microsoft.com/office/powerpoint/2010/main">
+    <mc:Choice Requires="p14">
       <p:transition spd="slow" p14:dur="2500">
         <p:checker/>
       </p:transition>
     </mc:Choice>
-    <mc:Fallback>
+    <mc:Fallback xmlns="">
       <p:transition spd="slow">
         <p:checker/>
       </p:transition>
@@ -11842,13 +11884,13 @@
   <p:clrMapOvr>
     <a:masterClrMapping/>
   </p:clrMapOvr>
-  <mc:AlternateContent xmlns:mc="http://schemas.openxmlformats.org/markup-compatibility/2006">
-    <mc:Choice xmlns:p14="http://schemas.microsoft.com/office/powerpoint/2010/main" Requires="p14">
+  <mc:AlternateContent xmlns:mc="http://schemas.openxmlformats.org/markup-compatibility/2006" xmlns:p14="http://schemas.microsoft.com/office/powerpoint/2010/main">
+    <mc:Choice Requires="p14">
       <p:transition spd="slow" p14:dur="2500">
         <p:checker/>
       </p:transition>
     </mc:Choice>
-    <mc:Fallback>
+    <mc:Fallback xmlns="">
       <p:transition spd="slow">
         <p:checker/>
       </p:transition>
@@ -12271,7 +12313,7 @@
                 <a:latin typeface="Cascadia Code" panose="020B0609020000020004" pitchFamily="49" charset="0"/>
                 <a:cs typeface="Cascadia Code" panose="020B0609020000020004" pitchFamily="49" charset="0"/>
               </a:rPr>
-              <a:t>SMOTE: tecnica di oversampling per la generazione sintetica di esempi della classe minoritaria</a:t>
+              <a:t>SMOTE: tecnica di oversampling per la generazione sintetica di esempi della classe minoritaria.</a:t>
             </a:r>
           </a:p>
           <a:p>
@@ -12291,7 +12333,7 @@
                 <a:latin typeface="Cascadia Code" panose="020B0609020000020004" pitchFamily="49" charset="0"/>
                 <a:cs typeface="Cascadia Code" panose="020B0609020000020004" pitchFamily="49" charset="0"/>
               </a:rPr>
-              <a:t>ENN: tecnica di undersampling la quale elimina esempi della classe maggioritaria rispetto alla densità della loro distribuzione </a:t>
+              <a:t>ENN: tecnica di undersampling la quale elimina esempi della classe maggioritaria rispetto alla densità della loro distribuzione. </a:t>
             </a:r>
           </a:p>
         </p:txBody>
@@ -12326,10 +12368,13 @@
           <a:p>
             <a:r>
               <a:rPr lang="it-IT" sz="1400" dirty="0">
+                <a:solidFill>
+                  <a:srgbClr val="D3AB03"/>
+                </a:solidFill>
                 <a:latin typeface="Cascadia Code" panose="020B0609020000020004" pitchFamily="49" charset="0"/>
                 <a:cs typeface="Cascadia Code" panose="020B0609020000020004" pitchFamily="49" charset="0"/>
               </a:rPr>
-              <a:t>ENN è capace di rimuover outliers!!!</a:t>
+              <a:t>ENN è capace di rimuovere outliers!!!</a:t>
             </a:r>
           </a:p>
         </p:txBody>
@@ -12344,13 +12389,13 @@
   <p:clrMapOvr>
     <a:masterClrMapping/>
   </p:clrMapOvr>
-  <mc:AlternateContent xmlns:mc="http://schemas.openxmlformats.org/markup-compatibility/2006">
-    <mc:Choice xmlns:p15="http://schemas.microsoft.com/office/powerpoint/2012/main" Requires="p15">
+  <mc:AlternateContent xmlns:mc="http://schemas.openxmlformats.org/markup-compatibility/2006" xmlns:p15="http://schemas.microsoft.com/office/powerpoint/2012/main">
+    <mc:Choice Requires="p15">
       <p:transition xmlns:p14="http://schemas.microsoft.com/office/powerpoint/2010/main" spd="slow" p14:dur="2000">
         <p15:prstTrans prst="fallOver"/>
       </p:transition>
     </mc:Choice>
-    <mc:Fallback>
+    <mc:Fallback xmlns="">
       <p:transition spd="slow">
         <p:fade/>
       </p:transition>
@@ -12839,13 +12884,13 @@
   <p:clrMapOvr>
     <a:masterClrMapping/>
   </p:clrMapOvr>
-  <mc:AlternateContent xmlns:mc="http://schemas.openxmlformats.org/markup-compatibility/2006">
-    <mc:Choice xmlns:p14="http://schemas.microsoft.com/office/powerpoint/2010/main" Requires="p14">
+  <mc:AlternateContent xmlns:mc="http://schemas.openxmlformats.org/markup-compatibility/2006" xmlns:p14="http://schemas.microsoft.com/office/powerpoint/2010/main">
+    <mc:Choice Requires="p14">
       <p:transition spd="slow" p14:dur="2500">
         <p:checker/>
       </p:transition>
     </mc:Choice>
-    <mc:Fallback>
+    <mc:Fallback xmlns="">
       <p:transition spd="slow">
         <p:checker/>
       </p:transition>
@@ -13280,7 +13325,7 @@
                 <a:latin typeface="Cascadia Code" panose="020B0609020000020004" pitchFamily="49" charset="0"/>
                 <a:cs typeface="Cascadia Code" panose="020B0609020000020004" pitchFamily="49" charset="0"/>
               </a:rPr>
-              <a:t>Contesa dura e non facile per noi dato il task meglio il gaussian naive bayes l’azienda potrà avere più certezze di non rimanere a corto di staff</a:t>
+              <a:t>Contesa dura e non facile per noi dato il task meglio il gaussian naive bayes l’azienda potrà avere più certezze di non rimanere a corto di staff.</a:t>
             </a:r>
           </a:p>
         </p:txBody>
@@ -13295,13 +13340,13 @@
   <p:clrMapOvr>
     <a:masterClrMapping/>
   </p:clrMapOvr>
-  <mc:AlternateContent xmlns:mc="http://schemas.openxmlformats.org/markup-compatibility/2006">
-    <mc:Choice xmlns:p14="http://schemas.microsoft.com/office/powerpoint/2010/main" Requires="p14">
+  <mc:AlternateContent xmlns:mc="http://schemas.openxmlformats.org/markup-compatibility/2006" xmlns:p14="http://schemas.microsoft.com/office/powerpoint/2010/main">
+    <mc:Choice Requires="p14">
       <p:transition spd="slow" p14:dur="2500">
         <p:checker/>
       </p:transition>
     </mc:Choice>
-    <mc:Fallback>
+    <mc:Fallback xmlns="">
       <p:transition spd="slow">
         <p:checker/>
       </p:transition>
@@ -13624,8 +13669,8 @@
         </p:nvSpPr>
         <p:spPr>
           <a:xfrm>
-            <a:off x="6641652" y="2110355"/>
-            <a:ext cx="5274460" cy="4247317"/>
+            <a:off x="6405114" y="1851094"/>
+            <a:ext cx="5013325" cy="4801314"/>
           </a:xfrm>
           <a:prstGeom prst="rect">
             <a:avLst/>
@@ -13643,7 +13688,7 @@
                 <a:latin typeface="Cascadia Code" panose="020B0609020000020004" pitchFamily="49" charset="0"/>
                 <a:cs typeface="Cascadia Code" panose="020B0609020000020004" pitchFamily="49" charset="0"/>
               </a:rPr>
-              <a:t>3 Modelli messi a confronto ogniuno per una tecnica dell’ensemble learning</a:t>
+              <a:t>3 Modelli messi a confronto ogniuno per una tecnica dell’ensemble learning:</a:t>
             </a:r>
           </a:p>
           <a:p>
@@ -13817,13 +13862,13 @@
   <p:clrMapOvr>
     <a:masterClrMapping/>
   </p:clrMapOvr>
-  <mc:AlternateContent xmlns:mc="http://schemas.openxmlformats.org/markup-compatibility/2006">
-    <mc:Choice xmlns:p15="http://schemas.microsoft.com/office/powerpoint/2012/main" Requires="p15">
+  <mc:AlternateContent xmlns:mc="http://schemas.openxmlformats.org/markup-compatibility/2006" xmlns:p15="http://schemas.microsoft.com/office/powerpoint/2012/main">
+    <mc:Choice Requires="p15">
       <p:transition xmlns:p14="http://schemas.microsoft.com/office/powerpoint/2010/main" spd="slow" p14:dur="2000">
         <p15:prstTrans prst="fallOver"/>
       </p:transition>
     </mc:Choice>
-    <mc:Fallback>
+    <mc:Fallback xmlns="">
       <p:transition spd="slow">
         <p:fade/>
       </p:transition>
@@ -14472,13 +14517,13 @@
   <p:clrMapOvr>
     <a:masterClrMapping/>
   </p:clrMapOvr>
-  <mc:AlternateContent xmlns:mc="http://schemas.openxmlformats.org/markup-compatibility/2006">
-    <mc:Choice xmlns:p15="http://schemas.microsoft.com/office/powerpoint/2012/main" Requires="p15">
+  <mc:AlternateContent xmlns:mc="http://schemas.openxmlformats.org/markup-compatibility/2006" xmlns:p15="http://schemas.microsoft.com/office/powerpoint/2012/main">
+    <mc:Choice Requires="p15">
       <p:transition xmlns:p14="http://schemas.microsoft.com/office/powerpoint/2010/main" spd="slow" p14:dur="2000">
         <p15:prstTrans prst="fallOver"/>
       </p:transition>
     </mc:Choice>
-    <mc:Fallback>
+    <mc:Fallback xmlns="">
       <p:transition spd="slow">
         <p:fade/>
       </p:transition>
@@ -14534,7 +14579,7 @@
         </p:blipFill>
         <p:spPr>
           <a:xfrm>
-            <a:off x="0" y="-1"/>
+            <a:off x="0" y="12164"/>
             <a:ext cx="6257024" cy="6857990"/>
           </a:xfrm>
           <a:prstGeom prst="rect">
@@ -14873,6 +14918,50 @@
           </a:prstGeom>
         </p:spPr>
       </p:pic>
+      <p:sp>
+        <p:nvSpPr>
+          <p:cNvPr id="4" name="TextBox 3">
+            <a:extLst>
+              <a:ext uri="{FF2B5EF4-FFF2-40B4-BE49-F238E27FC236}">
+                <a16:creationId xmlns:a16="http://schemas.microsoft.com/office/drawing/2014/main" id="{4A65C8E5-EC3F-F5FE-42AF-57F303617A4F}"/>
+              </a:ext>
+            </a:extLst>
+          </p:cNvPr>
+          <p:cNvSpPr txBox="1"/>
+          <p:nvPr/>
+        </p:nvSpPr>
+        <p:spPr>
+          <a:xfrm>
+            <a:off x="1043119" y="2183363"/>
+            <a:ext cx="4170784" cy="646331"/>
+          </a:xfrm>
+          <a:prstGeom prst="rect">
+            <a:avLst/>
+          </a:prstGeom>
+          <a:noFill/>
+        </p:spPr>
+        <p:txBody>
+          <a:bodyPr wrap="square" rtlCol="0">
+            <a:spAutoFit/>
+          </a:bodyPr>
+          <a:lstStyle/>
+          <a:p>
+            <a:r>
+              <a:rPr lang="it-IT" dirty="0">
+                <a:solidFill>
+                  <a:schemeClr val="bg1">
+                    <a:lumMod val="85000"/>
+                    <a:lumOff val="15000"/>
+                  </a:schemeClr>
+                </a:solidFill>
+                <a:latin typeface="Cascadia Code" panose="020B0609020000020004" pitchFamily="49" charset="0"/>
+                <a:cs typeface="Cascadia Code" panose="020B0609020000020004" pitchFamily="49" charset="0"/>
+              </a:rPr>
+              <a:t>Random Forest si dichiara il miglior modello di ensemble.</a:t>
+            </a:r>
+          </a:p>
+        </p:txBody>
+      </p:sp>
     </p:spTree>
     <p:extLst>
       <p:ext uri="{BB962C8B-B14F-4D97-AF65-F5344CB8AC3E}">
@@ -14883,13 +14972,13 @@
   <p:clrMapOvr>
     <a:masterClrMapping/>
   </p:clrMapOvr>
-  <mc:AlternateContent xmlns:mc="http://schemas.openxmlformats.org/markup-compatibility/2006">
-    <mc:Choice xmlns:p14="http://schemas.microsoft.com/office/powerpoint/2010/main" Requires="p14">
+  <mc:AlternateContent xmlns:mc="http://schemas.openxmlformats.org/markup-compatibility/2006" xmlns:p14="http://schemas.microsoft.com/office/powerpoint/2010/main">
+    <mc:Choice Requires="p14">
       <p:transition spd="slow" p14:dur="2500">
         <p:checker/>
       </p:transition>
     </mc:Choice>
-    <mc:Fallback>
+    <mc:Fallback xmlns="">
       <p:transition spd="slow">
         <p:checker/>
       </p:transition>
@@ -15165,7 +15254,7 @@
         </p:blipFill>
         <p:spPr>
           <a:xfrm>
-            <a:off x="3369962" y="5889632"/>
+            <a:off x="3332979" y="5922459"/>
             <a:ext cx="2217040" cy="365124"/>
           </a:xfrm>
           <a:prstGeom prst="rect">
@@ -15390,13 +15479,13 @@
   <p:clrMapOvr>
     <a:masterClrMapping/>
   </p:clrMapOvr>
-  <mc:AlternateContent xmlns:mc="http://schemas.openxmlformats.org/markup-compatibility/2006">
-    <mc:Choice xmlns:p15="http://schemas.microsoft.com/office/powerpoint/2012/main" Requires="p15">
+  <mc:AlternateContent xmlns:mc="http://schemas.openxmlformats.org/markup-compatibility/2006" xmlns:p15="http://schemas.microsoft.com/office/powerpoint/2012/main">
+    <mc:Choice Requires="p15">
       <p:transition xmlns:p14="http://schemas.microsoft.com/office/powerpoint/2010/main" spd="slow" p14:dur="2000">
         <p15:prstTrans prst="drape"/>
       </p:transition>
     </mc:Choice>
-    <mc:Fallback>
+    <mc:Fallback xmlns="">
       <p:transition spd="slow">
         <p:fade/>
       </p:transition>
@@ -15856,13 +15945,13 @@
   <p:clrMapOvr>
     <a:masterClrMapping/>
   </p:clrMapOvr>
-  <mc:AlternateContent xmlns:mc="http://schemas.openxmlformats.org/markup-compatibility/2006">
-    <mc:Choice xmlns:p14="http://schemas.microsoft.com/office/powerpoint/2010/main" Requires="p14">
+  <mc:AlternateContent xmlns:mc="http://schemas.openxmlformats.org/markup-compatibility/2006" xmlns:p14="http://schemas.microsoft.com/office/powerpoint/2010/main">
+    <mc:Choice Requires="p14">
       <p:transition spd="slow" p14:dur="2500">
         <p:checker/>
       </p:transition>
     </mc:Choice>
-    <mc:Fallback>
+    <mc:Fallback xmlns="">
       <p:transition spd="slow">
         <p:checker/>
       </p:transition>
@@ -16358,13 +16447,13 @@
   <p:clrMapOvr>
     <a:masterClrMapping/>
   </p:clrMapOvr>
-  <mc:AlternateContent xmlns:mc="http://schemas.openxmlformats.org/markup-compatibility/2006">
-    <mc:Choice xmlns:p14="http://schemas.microsoft.com/office/powerpoint/2010/main" Requires="p14">
+  <mc:AlternateContent xmlns:mc="http://schemas.openxmlformats.org/markup-compatibility/2006" xmlns:p14="http://schemas.microsoft.com/office/powerpoint/2010/main">
+    <mc:Choice Requires="p14">
       <p:transition spd="slow" p14:dur="2500">
         <p:checker/>
       </p:transition>
     </mc:Choice>
-    <mc:Fallback>
+    <mc:Fallback xmlns="">
       <p:transition spd="slow">
         <p:checker/>
       </p:transition>
@@ -16859,13 +16948,13 @@
   <p:clrMapOvr>
     <a:masterClrMapping/>
   </p:clrMapOvr>
-  <mc:AlternateContent xmlns:mc="http://schemas.openxmlformats.org/markup-compatibility/2006">
-    <mc:Choice xmlns:p14="http://schemas.microsoft.com/office/powerpoint/2010/main" Requires="p14">
+  <mc:AlternateContent xmlns:mc="http://schemas.openxmlformats.org/markup-compatibility/2006" xmlns:p14="http://schemas.microsoft.com/office/powerpoint/2010/main">
+    <mc:Choice Requires="p14">
       <p:transition spd="slow" p14:dur="2500">
         <p:checker/>
       </p:transition>
     </mc:Choice>
-    <mc:Fallback>
+    <mc:Fallback xmlns="">
       <p:transition spd="slow">
         <p:checker/>
       </p:transition>
@@ -17227,13 +17316,13 @@
   <p:clrMapOvr>
     <a:masterClrMapping/>
   </p:clrMapOvr>
-  <mc:AlternateContent xmlns:mc="http://schemas.openxmlformats.org/markup-compatibility/2006">
-    <mc:Choice xmlns:p14="http://schemas.microsoft.com/office/powerpoint/2010/main" Requires="p14">
+  <mc:AlternateContent xmlns:mc="http://schemas.openxmlformats.org/markup-compatibility/2006" xmlns:p14="http://schemas.microsoft.com/office/powerpoint/2010/main">
+    <mc:Choice Requires="p14">
       <p:transition spd="slow" p14:dur="2500">
         <p:checker/>
       </p:transition>
     </mc:Choice>
-    <mc:Fallback>
+    <mc:Fallback xmlns="">
       <p:transition spd="slow">
         <p:checker/>
       </p:transition>
@@ -17499,13 +17588,13 @@
   <p:clrMapOvr>
     <a:masterClrMapping/>
   </p:clrMapOvr>
-  <mc:AlternateContent xmlns:mc="http://schemas.openxmlformats.org/markup-compatibility/2006">
-    <mc:Choice xmlns:p14="http://schemas.microsoft.com/office/powerpoint/2010/main" Requires="p14">
+  <mc:AlternateContent xmlns:mc="http://schemas.openxmlformats.org/markup-compatibility/2006" xmlns:p14="http://schemas.microsoft.com/office/powerpoint/2010/main">
+    <mc:Choice Requires="p14">
       <p:transition spd="slow" p14:dur="2500">
         <p:checker/>
       </p:transition>
     </mc:Choice>
-    <mc:Fallback>
+    <mc:Fallback xmlns="">
       <p:transition spd="slow">
         <p:checker/>
       </p:transition>
@@ -17892,8 +17981,8 @@
         </p:blipFill>
         <p:spPr>
           <a:xfrm>
-            <a:off x="6965709" y="1768158"/>
-            <a:ext cx="4689268" cy="1895474"/>
+            <a:off x="6965709" y="1739402"/>
+            <a:ext cx="4689268" cy="1924230"/>
           </a:xfrm>
           <a:prstGeom prst="rect">
             <a:avLst/>
@@ -17991,13 +18080,13 @@
   <p:clrMapOvr>
     <a:masterClrMapping/>
   </p:clrMapOvr>
-  <mc:AlternateContent xmlns:mc="http://schemas.openxmlformats.org/markup-compatibility/2006">
-    <mc:Choice xmlns:p14="http://schemas.microsoft.com/office/powerpoint/2010/main" Requires="p14">
+  <mc:AlternateContent xmlns:mc="http://schemas.openxmlformats.org/markup-compatibility/2006" xmlns:p14="http://schemas.microsoft.com/office/powerpoint/2010/main">
+    <mc:Choice Requires="p14">
       <p:transition spd="slow" p14:dur="2500">
         <p:checker/>
       </p:transition>
     </mc:Choice>
-    <mc:Fallback>
+    <mc:Fallback xmlns="">
       <p:transition spd="slow">
         <p:checker/>
       </p:transition>
@@ -18504,7 +18593,7 @@
                 <a:latin typeface="Cascadia Code" panose="020B0609020000020004" pitchFamily="49" charset="0"/>
                 <a:cs typeface="Cascadia Code" panose="020B0609020000020004" pitchFamily="49" charset="0"/>
               </a:rPr>
-              <a:t>Nel complesso le performance migliorano i particolare si nota una miglioramento del recall sulla classe di nostro interesse</a:t>
+              <a:t>Nel complesso le performance migliorano in particolare si nota una miglioramento del recall sulla classe di nostro interesse</a:t>
             </a:r>
           </a:p>
         </p:txBody>
@@ -18558,13 +18647,13 @@
   <p:clrMapOvr>
     <a:masterClrMapping/>
   </p:clrMapOvr>
-  <mc:AlternateContent xmlns:mc="http://schemas.openxmlformats.org/markup-compatibility/2006">
-    <mc:Choice xmlns:p14="http://schemas.microsoft.com/office/powerpoint/2010/main" Requires="p14">
+  <mc:AlternateContent xmlns:mc="http://schemas.openxmlformats.org/markup-compatibility/2006" xmlns:p14="http://schemas.microsoft.com/office/powerpoint/2010/main">
+    <mc:Choice Requires="p14">
       <p:transition spd="slow" p14:dur="2500">
         <p:checker/>
       </p:transition>
     </mc:Choice>
-    <mc:Fallback>
+    <mc:Fallback xmlns="">
       <p:transition spd="slow">
         <p:checker/>
       </p:transition>

</xml_diff>

<commit_message>
modeifiche della documentazione e della presentazione
</commit_message>
<xml_diff>
--- a/documentation/presentazione_progetto_ICON.pptx
+++ b/documentation/presentazione_progetto_ICON.pptx
@@ -227,7 +227,7 @@
           <a:p>
             <a:fld id="{7D1B6EC6-B3D5-463C-81D6-CFCB32E6316D}" type="datetime1">
               <a:rPr lang="it-IT" smtClean="0"/>
-              <a:t>04/09/2023</a:t>
+              <a:t>11/09/2023</a:t>
             </a:fld>
             <a:endParaRPr lang="it-IT" dirty="0"/>
           </a:p>
@@ -399,7 +399,7 @@
             <a:pPr rtl="0"/>
             <a:fld id="{6C3BD83F-4E98-4492-9EEF-7E22B46C52B7}" type="datetime1">
               <a:rPr lang="it-IT" noProof="0" smtClean="0"/>
-              <a:t>04/09/2023</a:t>
+              <a:t>11/09/2023</a:t>
             </a:fld>
             <a:endParaRPr lang="it-IT" noProof="0" dirty="0"/>
           </a:p>
@@ -2789,7 +2789,7 @@
             <a:pPr rtl="0"/>
             <a:fld id="{CD48488A-4F48-47E0-8260-7D41BE6FA410}" type="datetime1">
               <a:rPr lang="it-IT" noProof="0" smtClean="0"/>
-              <a:t>04/09/2023</a:t>
+              <a:t>11/09/2023</a:t>
             </a:fld>
             <a:endParaRPr lang="it-IT" noProof="0" dirty="0"/>
           </a:p>
@@ -3103,7 +3103,7 @@
             <a:pPr rtl="0"/>
             <a:fld id="{733C4794-128B-4C0F-A4A7-AA8BE03E2FA9}" type="datetime1">
               <a:rPr lang="it-IT" noProof="0" smtClean="0"/>
-              <a:t>04/09/2023</a:t>
+              <a:t>11/09/2023</a:t>
             </a:fld>
             <a:endParaRPr lang="it-IT" noProof="0" dirty="0"/>
           </a:p>
@@ -3305,7 +3305,7 @@
             <a:pPr rtl="0"/>
             <a:fld id="{0503ED1E-7018-4DA6-8134-83156A27BB10}" type="datetime1">
               <a:rPr lang="it-IT" noProof="0" smtClean="0"/>
-              <a:t>04/09/2023</a:t>
+              <a:t>11/09/2023</a:t>
             </a:fld>
             <a:endParaRPr lang="it-IT" noProof="0" dirty="0"/>
           </a:p>
@@ -3576,7 +3576,7 @@
             <a:pPr rtl="0"/>
             <a:fld id="{84337AEC-A7EA-4682-AFCF-5F27F47858F3}" type="datetime1">
               <a:rPr lang="it-IT" noProof="0" smtClean="0"/>
-              <a:t>04/09/2023</a:t>
+              <a:t>11/09/2023</a:t>
             </a:fld>
             <a:endParaRPr lang="it-IT" noProof="0" dirty="0"/>
           </a:p>
@@ -4020,7 +4020,7 @@
             <a:pPr rtl="0"/>
             <a:fld id="{927D96A8-8287-4D86-94B7-4B8917520367}" type="datetime1">
               <a:rPr lang="it-IT" noProof="0" smtClean="0"/>
-              <a:t>04/09/2023</a:t>
+              <a:t>11/09/2023</a:t>
             </a:fld>
             <a:endParaRPr lang="it-IT" noProof="0" dirty="0"/>
           </a:p>
@@ -4565,7 +4565,7 @@
             <a:pPr rtl="0"/>
             <a:fld id="{9369EE22-9270-48A6-AFD0-E535A94FE8E0}" type="datetime1">
               <a:rPr lang="it-IT" noProof="0" smtClean="0"/>
-              <a:t>04/09/2023</a:t>
+              <a:t>11/09/2023</a:t>
             </a:fld>
             <a:endParaRPr lang="it-IT" noProof="0" dirty="0"/>
           </a:p>
@@ -5458,7 +5458,7 @@
             <a:pPr rtl="0"/>
             <a:fld id="{D607C866-0730-46A6-BB84-9179799DF62A}" type="datetime1">
               <a:rPr lang="it-IT" noProof="0" smtClean="0"/>
-              <a:t>04/09/2023</a:t>
+              <a:t>11/09/2023</a:t>
             </a:fld>
             <a:endParaRPr lang="it-IT" noProof="0" dirty="0"/>
           </a:p>
@@ -5636,7 +5636,7 @@
             <a:pPr rtl="0"/>
             <a:fld id="{1592212A-5A91-4B75-9DE0-88668A603883}" type="datetime1">
               <a:rPr lang="it-IT" noProof="0" smtClean="0"/>
-              <a:t>04/09/2023</a:t>
+              <a:t>11/09/2023</a:t>
             </a:fld>
             <a:endParaRPr lang="it-IT" noProof="0" dirty="0"/>
           </a:p>
@@ -5888,7 +5888,7 @@
             <a:pPr rtl="0"/>
             <a:fld id="{DE025C23-2866-4ADA-8F2F-B4AD19F29B5F}" type="datetime1">
               <a:rPr lang="it-IT" noProof="0" smtClean="0"/>
-              <a:t>04/09/2023</a:t>
+              <a:t>11/09/2023</a:t>
             </a:fld>
             <a:endParaRPr lang="it-IT" noProof="0" dirty="0"/>
           </a:p>
@@ -6138,7 +6138,7 @@
             <a:pPr rtl="0"/>
             <a:fld id="{42824D65-0630-4173-B0ED-465456127AA4}" type="datetime1">
               <a:rPr lang="it-IT" noProof="0" smtClean="0"/>
-              <a:t>04/09/2023</a:t>
+              <a:t>11/09/2023</a:t>
             </a:fld>
             <a:endParaRPr lang="it-IT" noProof="0" dirty="0"/>
           </a:p>
@@ -6629,7 +6629,7 @@
             <a:pPr rtl="0"/>
             <a:fld id="{86CA28E9-762F-4647-BD97-F1D5BB551A5F}" type="datetime1">
               <a:rPr lang="it-IT" noProof="0" smtClean="0"/>
-              <a:t>04/09/2023</a:t>
+              <a:t>11/09/2023</a:t>
             </a:fld>
             <a:endParaRPr lang="it-IT" noProof="0" dirty="0"/>
           </a:p>
@@ -6755,7 +6755,7 @@
             <a:pPr rtl="0"/>
             <a:fld id="{EF997553-0891-4141-8A2F-CABA328D53DC}" type="datetime1">
               <a:rPr lang="it-IT" noProof="0" smtClean="0"/>
-              <a:t>04/09/2023</a:t>
+              <a:t>11/09/2023</a:t>
             </a:fld>
             <a:endParaRPr lang="it-IT" noProof="0" dirty="0"/>
           </a:p>
@@ -6857,7 +6857,7 @@
             <a:pPr rtl="0"/>
             <a:fld id="{841CA6A7-31ED-46FD-93E2-0C054543503A}" type="datetime1">
               <a:rPr lang="it-IT" noProof="0" smtClean="0"/>
-              <a:t>04/09/2023</a:t>
+              <a:t>11/09/2023</a:t>
             </a:fld>
             <a:endParaRPr lang="it-IT" noProof="0" dirty="0"/>
           </a:p>
@@ -7120,7 +7120,7 @@
             <a:pPr rtl="0"/>
             <a:fld id="{6706D2B0-4130-4963-AD98-6B1613213BEB}" type="datetime1">
               <a:rPr lang="it-IT" noProof="0" smtClean="0"/>
-              <a:t>04/09/2023</a:t>
+              <a:t>11/09/2023</a:t>
             </a:fld>
             <a:endParaRPr lang="it-IT" noProof="0" dirty="0"/>
           </a:p>
@@ -7436,7 +7436,7 @@
             <a:pPr rtl="0"/>
             <a:fld id="{9269901F-A34B-4352-8E4D-BBCD6CEF0AA4}" type="datetime1">
               <a:rPr lang="it-IT" noProof="0" smtClean="0"/>
-              <a:t>04/09/2023</a:t>
+              <a:t>11/09/2023</a:t>
             </a:fld>
             <a:endParaRPr lang="it-IT" noProof="0" dirty="0"/>
           </a:p>
@@ -7676,7 +7676,7 @@
             <a:pPr rtl="0"/>
             <a:fld id="{3B46ECF3-FDF4-4B28-B17D-8C5F232B4BD1}" type="datetime1">
               <a:rPr lang="it-IT" noProof="0" smtClean="0"/>
-              <a:t>04/09/2023</a:t>
+              <a:t>11/09/2023</a:t>
             </a:fld>
             <a:endParaRPr lang="it-IT" noProof="0" dirty="0"/>
           </a:p>
@@ -8562,7 +8562,7 @@
           </a:effectLst>
           <a:extLst>
             <a:ext uri="{91240B29-F687-4f45-9708-019B960494DF}">
-              <a14:hiddenLine xmlns="" xmlns:a14="http://schemas.microsoft.com/office/drawing/2010/main" xmlns:a16="http://schemas.microsoft.com/office/drawing/2014/main" xmlns:p14="http://schemas.microsoft.com/office/powerpoint/2010/main" w="9525">
+              <a14:hiddenLine xmlns:p14="http://schemas.microsoft.com/office/powerpoint/2010/main" xmlns:a16="http://schemas.microsoft.com/office/drawing/2014/main" xmlns:a14="http://schemas.microsoft.com/office/drawing/2010/main" xmlns="" w="9525">
                 <a:solidFill>
                   <a:srgbClr val="000000"/>
                 </a:solidFill>
@@ -9203,7 +9203,7 @@
                 <a:latin typeface="Cascadia Code" panose="020B0609020000020004" pitchFamily="49" charset="0"/>
                 <a:cs typeface="Cascadia Code" panose="020B0609020000020004" pitchFamily="49" charset="0"/>
               </a:rPr>
-              <a:t>04/09/2023</a:t>
+              <a:t>11/09/2023</a:t>
             </a:fld>
             <a:endParaRPr lang="it-IT" sz="1400" noProof="0" dirty="0">
               <a:solidFill>
@@ -9711,7 +9711,7 @@
                 <a:latin typeface="Cascadia Code" panose="020B0609020000020004" pitchFamily="49" charset="0"/>
                 <a:cs typeface="Cascadia Code" panose="020B0609020000020004" pitchFamily="49" charset="0"/>
               </a:rPr>
-              <a:t>04/09/2023</a:t>
+              <a:t>11/09/2023</a:t>
             </a:fld>
             <a:endParaRPr lang="it-IT" sz="1400" noProof="0" dirty="0">
               <a:solidFill>
@@ -10154,7 +10154,7 @@
                 <a:latin typeface="Cascadia Code" panose="020B0609020000020004" pitchFamily="49" charset="0"/>
                 <a:cs typeface="Cascadia Code" panose="020B0609020000020004" pitchFamily="49" charset="0"/>
               </a:rPr>
-              <a:t>04/09/2023</a:t>
+              <a:t>11/09/2023</a:t>
             </a:fld>
             <a:endParaRPr lang="it-IT" sz="1400" noProof="0" dirty="0">
               <a:solidFill>
@@ -10641,7 +10641,7 @@
                 <a:latin typeface="Cascadia Code" panose="020B0609020000020004" pitchFamily="49" charset="0"/>
                 <a:cs typeface="Cascadia Code" panose="020B0609020000020004" pitchFamily="49" charset="0"/>
               </a:rPr>
-              <a:t>04/09/2023</a:t>
+              <a:t>11/09/2023</a:t>
             </a:fld>
             <a:endParaRPr lang="it-IT" sz="1400" noProof="0" dirty="0">
               <a:solidFill>
@@ -11149,7 +11149,7 @@
                 <a:latin typeface="Cascadia Code" panose="020B0609020000020004" pitchFamily="49" charset="0"/>
                 <a:cs typeface="Cascadia Code" panose="020B0609020000020004" pitchFamily="49" charset="0"/>
               </a:rPr>
-              <a:t>04/09/2023</a:t>
+              <a:t>11/09/2023</a:t>
             </a:fld>
             <a:endParaRPr lang="it-IT" sz="1400" noProof="0" dirty="0">
               <a:solidFill>
@@ -11608,7 +11608,7 @@
                 <a:latin typeface="Cascadia Code" panose="020B0609020000020004" pitchFamily="49" charset="0"/>
                 <a:cs typeface="Cascadia Code" panose="020B0609020000020004" pitchFamily="49" charset="0"/>
               </a:rPr>
-              <a:t>04/09/2023</a:t>
+              <a:t>11/09/2023</a:t>
             </a:fld>
             <a:endParaRPr lang="it-IT" sz="1400" noProof="0" dirty="0">
               <a:solidFill>
@@ -12096,7 +12096,7 @@
                 <a:latin typeface="Cascadia Code" panose="020B0609020000020004" pitchFamily="49" charset="0"/>
                 <a:cs typeface="Cascadia Code" panose="020B0609020000020004" pitchFamily="49" charset="0"/>
               </a:rPr>
-              <a:t>04/09/2023</a:t>
+              <a:t>11/09/2023</a:t>
             </a:fld>
             <a:endParaRPr lang="it-IT" sz="1400" noProof="0" dirty="0">
               <a:solidFill>
@@ -12604,7 +12604,7 @@
                 <a:latin typeface="Cascadia Code" panose="020B0609020000020004" pitchFamily="49" charset="0"/>
                 <a:cs typeface="Cascadia Code" panose="020B0609020000020004" pitchFamily="49" charset="0"/>
               </a:rPr>
-              <a:t>04/09/2023</a:t>
+              <a:t>11/09/2023</a:t>
             </a:fld>
             <a:endParaRPr lang="it-IT" sz="1400" noProof="0" dirty="0">
               <a:solidFill>
@@ -13064,7 +13064,7 @@
                 <a:latin typeface="Cascadia Code" panose="020B0609020000020004" pitchFamily="49" charset="0"/>
                 <a:cs typeface="Cascadia Code" panose="020B0609020000020004" pitchFamily="49" charset="0"/>
               </a:rPr>
-              <a:t>04/09/2023</a:t>
+              <a:t>11/09/2023</a:t>
             </a:fld>
             <a:endParaRPr lang="it-IT" sz="1400" noProof="0" dirty="0">
               <a:solidFill>
@@ -13582,7 +13582,7 @@
                 <a:latin typeface="Cascadia Code" panose="020B0609020000020004" pitchFamily="49" charset="0"/>
                 <a:cs typeface="Cascadia Code" panose="020B0609020000020004" pitchFamily="49" charset="0"/>
               </a:rPr>
-              <a:t>04/09/2023</a:t>
+              <a:t>11/09/2023</a:t>
             </a:fld>
             <a:endParaRPr lang="it-IT" sz="1400" noProof="0" dirty="0">
               <a:solidFill>
@@ -14037,7 +14037,7 @@
                 <a:latin typeface="Cascadia Code" panose="020B0609020000020004" pitchFamily="49" charset="0"/>
                 <a:cs typeface="Cascadia Code" panose="020B0609020000020004" pitchFamily="49" charset="0"/>
               </a:rPr>
-              <a:t>04/09/2023</a:t>
+              <a:t>11/09/2023</a:t>
             </a:fld>
             <a:endParaRPr lang="it-IT" sz="1400" noProof="0" dirty="0">
               <a:solidFill>
@@ -14679,7 +14679,7 @@
                 <a:latin typeface="Cascadia Code" panose="020B0609020000020004" pitchFamily="49" charset="0"/>
                 <a:cs typeface="Cascadia Code" panose="020B0609020000020004" pitchFamily="49" charset="0"/>
               </a:rPr>
-              <a:t>04/09/2023</a:t>
+              <a:t>11/09/2023</a:t>
             </a:fld>
             <a:endParaRPr lang="it-IT" sz="1400" noProof="0" dirty="0">
               <a:solidFill>
@@ -14943,12 +14943,56 @@
           </a:p>
         </p:txBody>
       </p:sp>
+      <p:sp>
+        <p:nvSpPr>
+          <p:cNvPr id="15" name="TextBox 14">
+            <a:extLst>
+              <a:ext uri="{FF2B5EF4-FFF2-40B4-BE49-F238E27FC236}">
+                <a16:creationId xmlns:a16="http://schemas.microsoft.com/office/drawing/2014/main" id="{AC2710FE-6F31-EAFB-7185-AAA1D493A598}"/>
+              </a:ext>
+            </a:extLst>
+          </p:cNvPr>
+          <p:cNvSpPr txBox="1"/>
+          <p:nvPr/>
+        </p:nvSpPr>
+        <p:spPr>
+          <a:xfrm>
+            <a:off x="426098" y="3139889"/>
+            <a:ext cx="5827473" cy="307777"/>
+          </a:xfrm>
+          <a:prstGeom prst="rect">
+            <a:avLst/>
+          </a:prstGeom>
+          <a:noFill/>
+        </p:spPr>
+        <p:txBody>
+          <a:bodyPr wrap="square" rtlCol="0">
+            <a:spAutoFit/>
+          </a:bodyPr>
+          <a:lstStyle/>
+          <a:p>
+            <a:r>
+              <a:rPr lang="it-IT" sz="1400" dirty="0">
+                <a:solidFill>
+                  <a:schemeClr val="bg1">
+                    <a:lumMod val="85000"/>
+                    <a:lumOff val="15000"/>
+                  </a:schemeClr>
+                </a:solidFill>
+                <a:latin typeface="Cascadia Code" panose="020B0609020000020004" pitchFamily="49" charset="0"/>
+                <a:cs typeface="Cascadia Code" panose="020B0609020000020004" pitchFamily="49" charset="0"/>
+              </a:rPr>
+              <a:t>Migliori parametri per ADABoost</a:t>
+            </a:r>
+          </a:p>
+        </p:txBody>
+      </p:sp>
       <p:pic>
         <p:nvPicPr>
-          <p:cNvPr id="10" name="Picture 9">
-            <a:extLst>
-              <a:ext uri="{FF2B5EF4-FFF2-40B4-BE49-F238E27FC236}">
-                <a16:creationId xmlns:a16="http://schemas.microsoft.com/office/drawing/2014/main" id="{BF261071-C15E-0D50-D41E-69EE9AA1305A}"/>
+          <p:cNvPr id="21" name="Picture 20">
+            <a:extLst>
+              <a:ext uri="{FF2B5EF4-FFF2-40B4-BE49-F238E27FC236}">
+                <a16:creationId xmlns:a16="http://schemas.microsoft.com/office/drawing/2014/main" id="{88860762-EE8F-B244-82B6-E7F9DC012761}"/>
               </a:ext>
             </a:extLst>
           </p:cNvPr>
@@ -14965,58 +15009,14 @@
         </p:blipFill>
         <p:spPr>
           <a:xfrm>
-            <a:off x="400610" y="3406066"/>
-            <a:ext cx="5459013" cy="511109"/>
+            <a:off x="400610" y="3447666"/>
+            <a:ext cx="5459013" cy="686126"/>
           </a:xfrm>
           <a:prstGeom prst="rect">
             <a:avLst/>
           </a:prstGeom>
         </p:spPr>
       </p:pic>
-      <p:sp>
-        <p:nvSpPr>
-          <p:cNvPr id="15" name="TextBox 14">
-            <a:extLst>
-              <a:ext uri="{FF2B5EF4-FFF2-40B4-BE49-F238E27FC236}">
-                <a16:creationId xmlns:a16="http://schemas.microsoft.com/office/drawing/2014/main" id="{AC2710FE-6F31-EAFB-7185-AAA1D493A598}"/>
-              </a:ext>
-            </a:extLst>
-          </p:cNvPr>
-          <p:cNvSpPr txBox="1"/>
-          <p:nvPr/>
-        </p:nvSpPr>
-        <p:spPr>
-          <a:xfrm>
-            <a:off x="426098" y="3139889"/>
-            <a:ext cx="5827473" cy="307777"/>
-          </a:xfrm>
-          <a:prstGeom prst="rect">
-            <a:avLst/>
-          </a:prstGeom>
-          <a:noFill/>
-        </p:spPr>
-        <p:txBody>
-          <a:bodyPr wrap="square" rtlCol="0">
-            <a:spAutoFit/>
-          </a:bodyPr>
-          <a:lstStyle/>
-          <a:p>
-            <a:r>
-              <a:rPr lang="it-IT" sz="1400" dirty="0">
-                <a:solidFill>
-                  <a:schemeClr val="bg1">
-                    <a:lumMod val="85000"/>
-                    <a:lumOff val="15000"/>
-                  </a:schemeClr>
-                </a:solidFill>
-                <a:latin typeface="Cascadia Code" panose="020B0609020000020004" pitchFamily="49" charset="0"/>
-                <a:cs typeface="Cascadia Code" panose="020B0609020000020004" pitchFamily="49" charset="0"/>
-              </a:rPr>
-              <a:t>Migliori parametri per il Gaussian Naive Bayes</a:t>
-            </a:r>
-          </a:p>
-        </p:txBody>
-      </p:sp>
     </p:spTree>
     <p:extLst>
       <p:ext uri="{BB962C8B-B14F-4D97-AF65-F5344CB8AC3E}">
@@ -15132,7 +15132,7 @@
                 <a:latin typeface="Cascadia Code" panose="020B0609020000020004" pitchFamily="49" charset="0"/>
                 <a:cs typeface="Cascadia Code" panose="020B0609020000020004" pitchFamily="49" charset="0"/>
               </a:rPr>
-              <a:t>04/09/2023</a:t>
+              <a:t>11/09/2023</a:t>
             </a:fld>
             <a:endParaRPr lang="it-IT" sz="1400" noProof="0" dirty="0">
               <a:solidFill>
@@ -15706,7 +15706,7 @@
                 <a:latin typeface="Cascadia Code" panose="020B0609020000020004" pitchFamily="49" charset="0"/>
                 <a:cs typeface="Cascadia Code" panose="020B0609020000020004" pitchFamily="49" charset="0"/>
               </a:rPr>
-              <a:t>04/09/2023</a:t>
+              <a:t>11/09/2023</a:t>
             </a:fld>
             <a:endParaRPr lang="it-IT" sz="1400" noProof="0" dirty="0">
               <a:solidFill>
@@ -16186,7 +16186,7 @@
                 <a:latin typeface="Cascadia Code" panose="020B0609020000020004" pitchFamily="49" charset="0"/>
                 <a:cs typeface="Cascadia Code" panose="020B0609020000020004" pitchFamily="49" charset="0"/>
               </a:rPr>
-              <a:t>04/09/2023</a:t>
+              <a:t>11/09/2023</a:t>
             </a:fld>
             <a:endParaRPr lang="it-IT" sz="1400" noProof="0" dirty="0">
               <a:solidFill>
@@ -16688,7 +16688,7 @@
                 <a:latin typeface="Cascadia Code" panose="020B0609020000020004" pitchFamily="49" charset="0"/>
                 <a:cs typeface="Cascadia Code" panose="020B0609020000020004" pitchFamily="49" charset="0"/>
               </a:rPr>
-              <a:t>04/09/2023</a:t>
+              <a:t>11/09/2023</a:t>
             </a:fld>
             <a:endParaRPr lang="it-IT" sz="1400" noProof="0" dirty="0">
               <a:solidFill>
@@ -17176,7 +17176,7 @@
                 <a:latin typeface="Cascadia Code" panose="020B0609020000020004" pitchFamily="49" charset="0"/>
                 <a:cs typeface="Cascadia Code" panose="020B0609020000020004" pitchFamily="49" charset="0"/>
               </a:rPr>
-              <a:t>04/09/2023</a:t>
+              <a:t>11/09/2023</a:t>
             </a:fld>
             <a:endParaRPr lang="it-IT" sz="1400" noProof="0" dirty="0">
               <a:solidFill>
@@ -17557,7 +17557,7 @@
                 <a:latin typeface="Cascadia Code" panose="020B0609020000020004" pitchFamily="49" charset="0"/>
                 <a:cs typeface="Cascadia Code" panose="020B0609020000020004" pitchFamily="49" charset="0"/>
               </a:rPr>
-              <a:t>04/09/2023</a:t>
+              <a:t>11/09/2023</a:t>
             </a:fld>
             <a:endParaRPr lang="it-IT" sz="1400" noProof="0" dirty="0">
               <a:solidFill>
@@ -17997,7 +17997,7 @@
                 <a:latin typeface="Cascadia Code" panose="020B0609020000020004" pitchFamily="49" charset="0"/>
                 <a:cs typeface="Cascadia Code" panose="020B0609020000020004" pitchFamily="49" charset="0"/>
               </a:rPr>
-              <a:t>04/09/2023</a:t>
+              <a:t>11/09/2023</a:t>
             </a:fld>
             <a:endParaRPr lang="it-IT" sz="1400" noProof="0" dirty="0">
               <a:solidFill>
@@ -18603,7 +18603,7 @@
                 <a:latin typeface="Cascadia Code" panose="020B0609020000020004" pitchFamily="49" charset="0"/>
                 <a:cs typeface="Cascadia Code" panose="020B0609020000020004" pitchFamily="49" charset="0"/>
               </a:rPr>
-              <a:t>04/09/2023</a:t>
+              <a:t>11/09/2023</a:t>
             </a:fld>
             <a:endParaRPr lang="it-IT" sz="1400" noProof="0" dirty="0">
               <a:solidFill>
@@ -19914,21 +19914,21 @@
 </file>
 
 <file path=customXml/item2.xml><?xml version="1.0" encoding="utf-8"?>
+<?mso-contentType ?>
+<FormTemplates xmlns="http://schemas.microsoft.com/sharepoint/v3/contenttype/forms">
+  <Display>DocumentLibraryForm</Display>
+  <Edit>DocumentLibraryForm</Edit>
+  <New>DocumentLibraryForm</New>
+</FormTemplates>
+</file>
+
+<file path=customXml/item3.xml><?xml version="1.0" encoding="utf-8"?>
 <p:properties xmlns:p="http://schemas.microsoft.com/office/2006/metadata/properties" xmlns:xsi="http://www.w3.org/2001/XMLSchema-instance" xmlns:pc="http://schemas.microsoft.com/office/infopath/2007/PartnerControls">
   <documentManagement>
     <Status xmlns="71af3243-3dd4-4a8d-8c0d-dd76da1f02a5">Not started</Status>
     <MediaServiceKeyPoints xmlns="71af3243-3dd4-4a8d-8c0d-dd76da1f02a5" xsi:nil="true"/>
   </documentManagement>
 </p:properties>
-</file>
-
-<file path=customXml/item3.xml><?xml version="1.0" encoding="utf-8"?>
-<?mso-contentType ?>
-<FormTemplates xmlns="http://schemas.microsoft.com/sharepoint/v3/contenttype/forms">
-  <Display>DocumentLibraryForm</Display>
-  <Edit>DocumentLibraryForm</Edit>
-  <New>DocumentLibraryForm</New>
-</FormTemplates>
 </file>
 
 <file path=customXml/itemProps1.xml><?xml version="1.0" encoding="utf-8"?>
@@ -19951,6 +19951,14 @@
 </file>
 
 <file path=customXml/itemProps2.xml><?xml version="1.0" encoding="utf-8"?>
+<ds:datastoreItem xmlns:ds="http://schemas.openxmlformats.org/officeDocument/2006/customXml" ds:itemID="{64B270AB-C138-415C-897E-3C24487DECF1}">
+  <ds:schemaRefs>
+    <ds:schemaRef ds:uri="http://schemas.microsoft.com/sharepoint/v3/contenttype/forms"/>
+  </ds:schemaRefs>
+</ds:datastoreItem>
+</file>
+
+<file path=customXml/itemProps3.xml><?xml version="1.0" encoding="utf-8"?>
 <ds:datastoreItem xmlns:ds="http://schemas.openxmlformats.org/officeDocument/2006/customXml" ds:itemID="{2C4C00F4-06E9-43E3-AD97-88A857CEFA82}">
   <ds:schemaRefs>
     <ds:schemaRef ds:uri="http://schemas.microsoft.com/office/2006/metadata/properties"/>
@@ -19958,12 +19966,4 @@
     <ds:schemaRef ds:uri="71af3243-3dd4-4a8d-8c0d-dd76da1f02a5"/>
   </ds:schemaRefs>
 </ds:datastoreItem>
-</file>
-
-<file path=customXml/itemProps3.xml><?xml version="1.0" encoding="utf-8"?>
-<ds:datastoreItem xmlns:ds="http://schemas.openxmlformats.org/officeDocument/2006/customXml" ds:itemID="{64B270AB-C138-415C-897E-3C24487DECF1}">
-  <ds:schemaRefs>
-    <ds:schemaRef ds:uri="http://schemas.microsoft.com/sharepoint/v3/contenttype/forms"/>
-  </ds:schemaRefs>
-</ds:datastoreItem>
 </file>
</xml_diff>